<commit_message>
Project 81% accuracy achieved yet
</commit_message>
<xml_diff>
--- a/Reports/Mid Defense/Mid Defense Presentation.pptx
+++ b/Reports/Mid Defense/Mid Defense Presentation.pptx
@@ -222,7 +222,7 @@
           <a:p>
             <a:fld id="{E0DDFADA-F1FA-4B02-81F8-56CF59DBC919}" type="datetimeFigureOut">
               <a:rPr lang="en-US" smtClean="0"/>
-              <a:t>7/17/2025</a:t>
+              <a:t>7/18/2025</a:t>
             </a:fld>
             <a:endParaRPr lang="en-US"/>
           </a:p>
@@ -702,7 +702,7 @@
           <a:p>
             <a:fld id="{6D93A3E9-C0A9-442A-B220-D4EDFCBAA84C}" type="datetime1">
               <a:rPr lang="en-US" smtClean="0"/>
-              <a:t>7/17/2025</a:t>
+              <a:t>7/18/2025</a:t>
             </a:fld>
             <a:endParaRPr lang="en-US"/>
           </a:p>
@@ -873,7 +873,7 @@
           <a:p>
             <a:fld id="{AE5A862B-3B5E-4397-AAF4-6EA2D6C2DE27}" type="datetime1">
               <a:rPr lang="en-US" smtClean="0"/>
-              <a:t>7/17/2025</a:t>
+              <a:t>7/18/2025</a:t>
             </a:fld>
             <a:endParaRPr lang="en-US"/>
           </a:p>
@@ -1054,7 +1054,7 @@
           <a:p>
             <a:fld id="{19D87E99-8C08-4F96-8201-05CD0C5638D7}" type="datetime1">
               <a:rPr lang="en-US" smtClean="0"/>
-              <a:t>7/17/2025</a:t>
+              <a:t>7/18/2025</a:t>
             </a:fld>
             <a:endParaRPr lang="en-US"/>
           </a:p>
@@ -1225,7 +1225,7 @@
           <a:p>
             <a:fld id="{235672FD-9DCB-4C38-9235-AE05880C8E19}" type="datetime1">
               <a:rPr lang="en-US" smtClean="0"/>
-              <a:t>7/17/2025</a:t>
+              <a:t>7/18/2025</a:t>
             </a:fld>
             <a:endParaRPr lang="en-US"/>
           </a:p>
@@ -1473,7 +1473,7 @@
           <a:p>
             <a:fld id="{C48D3626-F4E4-4022-A288-C2A032A7B310}" type="datetime1">
               <a:rPr lang="en-US" smtClean="0"/>
-              <a:t>7/17/2025</a:t>
+              <a:t>7/18/2025</a:t>
             </a:fld>
             <a:endParaRPr lang="en-US"/>
           </a:p>
@@ -1705,7 +1705,7 @@
           <a:p>
             <a:fld id="{3529C17B-5BD4-45B0-A712-04849803A66F}" type="datetime1">
               <a:rPr lang="en-US" smtClean="0"/>
-              <a:t>7/17/2025</a:t>
+              <a:t>7/18/2025</a:t>
             </a:fld>
             <a:endParaRPr lang="en-US"/>
           </a:p>
@@ -2072,7 +2072,7 @@
           <a:p>
             <a:fld id="{0A531C78-5B33-402E-B54F-0F0E630E119B}" type="datetime1">
               <a:rPr lang="en-US" smtClean="0"/>
-              <a:t>7/17/2025</a:t>
+              <a:t>7/18/2025</a:t>
             </a:fld>
             <a:endParaRPr lang="en-US"/>
           </a:p>
@@ -2192,7 +2192,7 @@
           <a:p>
             <a:fld id="{1C5D40FF-9114-4C15-8799-B2213546B8EC}" type="datetime1">
               <a:rPr lang="en-US" smtClean="0"/>
-              <a:t>7/17/2025</a:t>
+              <a:t>7/18/2025</a:t>
             </a:fld>
             <a:endParaRPr lang="en-US"/>
           </a:p>
@@ -2290,7 +2290,7 @@
           <a:p>
             <a:fld id="{DC9198FC-82F4-44D0-95D4-BDB2635FF1E3}" type="datetime1">
               <a:rPr lang="en-US" smtClean="0"/>
-              <a:t>7/17/2025</a:t>
+              <a:t>7/18/2025</a:t>
             </a:fld>
             <a:endParaRPr lang="en-US"/>
           </a:p>
@@ -2568,7 +2568,7 @@
           <a:p>
             <a:fld id="{0D3B5067-23B2-4A47-B861-B6AD9755EB6A}" type="datetime1">
               <a:rPr lang="en-US" smtClean="0"/>
-              <a:t>7/17/2025</a:t>
+              <a:t>7/18/2025</a:t>
             </a:fld>
             <a:endParaRPr lang="en-US"/>
           </a:p>
@@ -2823,7 +2823,7 @@
           <a:p>
             <a:fld id="{D6717004-1295-4CBD-B226-47568F44F7DC}" type="datetime1">
               <a:rPr lang="en-US" smtClean="0"/>
-              <a:t>7/17/2025</a:t>
+              <a:t>7/18/2025</a:t>
             </a:fld>
             <a:endParaRPr lang="en-US"/>
           </a:p>
@@ -3037,7 +3037,7 @@
           <a:p>
             <a:fld id="{3DD380BE-3BCB-4CE2-A1E1-8CB018944DB9}" type="datetime1">
               <a:rPr lang="en-US" smtClean="0"/>
-              <a:t>7/17/2025</a:t>
+              <a:t>7/18/2025</a:t>
             </a:fld>
             <a:endParaRPr lang="en-US"/>
           </a:p>
@@ -5338,18 +5338,18 @@
               <a:t>Train and test on </a:t>
             </a:r>
             <a:r>
-              <a:rPr lang="en-US" sz="2800" dirty="0" err="1">
+              <a:rPr lang="en-US" sz="2800">
                 <a:latin typeface="Times New Roman" panose="02020603050405020304" pitchFamily="18" charset="0"/>
                 <a:cs typeface="Times New Roman" panose="02020603050405020304" pitchFamily="18" charset="0"/>
               </a:rPr>
-              <a:t>dermnet</a:t>
+              <a:t>kaggle </a:t>
             </a:r>
             <a:r>
               <a:rPr lang="en-US" sz="2800" dirty="0">
                 <a:latin typeface="Times New Roman" panose="02020603050405020304" pitchFamily="18" charset="0"/>
                 <a:cs typeface="Times New Roman" panose="02020603050405020304" pitchFamily="18" charset="0"/>
               </a:rPr>
-              <a:t> dataset</a:t>
+              <a:t>dataset</a:t>
             </a:r>
           </a:p>
           <a:p>

</xml_diff>